<commit_message>
Luego invento más si me encuentro más inspirado
</commit_message>
<xml_diff>
--- a/TrabajoDesarrollo-BDII-GonzaloSenovilla-MiguelVítores.pptx
+++ b/TrabajoDesarrollo-BDII-GonzaloSenovilla-MiguelVítores.pptx
@@ -9,15 +9,16 @@
     <p:sldId id="257" r:id="rId3"/>
     <p:sldId id="258" r:id="rId4"/>
     <p:sldId id="259" r:id="rId5"/>
-    <p:sldId id="260" r:id="rId6"/>
-    <p:sldId id="268" r:id="rId7"/>
-    <p:sldId id="261" r:id="rId8"/>
-    <p:sldId id="262" r:id="rId9"/>
-    <p:sldId id="263" r:id="rId10"/>
-    <p:sldId id="264" r:id="rId11"/>
-    <p:sldId id="265" r:id="rId12"/>
-    <p:sldId id="266" r:id="rId13"/>
-    <p:sldId id="267" r:id="rId14"/>
+    <p:sldId id="269" r:id="rId6"/>
+    <p:sldId id="260" r:id="rId7"/>
+    <p:sldId id="268" r:id="rId8"/>
+    <p:sldId id="261" r:id="rId9"/>
+    <p:sldId id="262" r:id="rId10"/>
+    <p:sldId id="263" r:id="rId11"/>
+    <p:sldId id="264" r:id="rId12"/>
+    <p:sldId id="265" r:id="rId13"/>
+    <p:sldId id="266" r:id="rId14"/>
+    <p:sldId id="267" r:id="rId15"/>
   </p:sldIdLst>
   <p:sldSz cx="12192000" cy="6858000"/>
   <p:notesSz cx="6858000" cy="9144000"/>
@@ -116,6 +117,11 @@
       </a:defRPr>
     </a:lvl9pPr>
   </p:defaultTextStyle>
+  <p:extLst>
+    <p:ext uri="{EFAFB233-063F-42B5-8137-9DF3F51BA10A}">
+      <p15:sldGuideLst xmlns:p15="http://schemas.microsoft.com/office/powerpoint/2012/main"/>
+    </p:ext>
+  </p:extLst>
 </p:presentation>
 </file>
 
@@ -345,7 +351,7 @@
           <a:p>
             <a:fld id="{302CAE88-2E46-472D-AA2C-0CF4CF23A1F6}" type="datetimeFigureOut">
               <a:rPr lang="es-ES" smtClean="0"/>
-              <a:t>01/05/2019</a:t>
+              <a:t>02/05/2019</a:t>
             </a:fld>
             <a:endParaRPr lang="es-ES"/>
           </a:p>
@@ -553,7 +559,7 @@
           <a:p>
             <a:fld id="{302CAE88-2E46-472D-AA2C-0CF4CF23A1F6}" type="datetimeFigureOut">
               <a:rPr lang="es-ES" smtClean="0"/>
-              <a:t>01/05/2019</a:t>
+              <a:t>02/05/2019</a:t>
             </a:fld>
             <a:endParaRPr lang="es-ES"/>
           </a:p>
@@ -809,7 +815,7 @@
           <a:p>
             <a:fld id="{302CAE88-2E46-472D-AA2C-0CF4CF23A1F6}" type="datetimeFigureOut">
               <a:rPr lang="es-ES" smtClean="0"/>
-              <a:t>01/05/2019</a:t>
+              <a:t>02/05/2019</a:t>
             </a:fld>
             <a:endParaRPr lang="es-ES"/>
           </a:p>
@@ -983,7 +989,7 @@
           <a:p>
             <a:fld id="{302CAE88-2E46-472D-AA2C-0CF4CF23A1F6}" type="datetimeFigureOut">
               <a:rPr lang="es-ES" smtClean="0"/>
-              <a:t>01/05/2019</a:t>
+              <a:t>02/05/2019</a:t>
             </a:fld>
             <a:endParaRPr lang="es-ES"/>
           </a:p>
@@ -1326,7 +1332,7 @@
           <a:p>
             <a:fld id="{302CAE88-2E46-472D-AA2C-0CF4CF23A1F6}" type="datetimeFigureOut">
               <a:rPr lang="es-ES" smtClean="0"/>
-              <a:t>01/05/2019</a:t>
+              <a:t>02/05/2019</a:t>
             </a:fld>
             <a:endParaRPr lang="es-ES"/>
           </a:p>
@@ -1601,7 +1607,7 @@
           <a:p>
             <a:fld id="{302CAE88-2E46-472D-AA2C-0CF4CF23A1F6}" type="datetimeFigureOut">
               <a:rPr lang="es-ES" smtClean="0"/>
-              <a:t>01/05/2019</a:t>
+              <a:t>02/05/2019</a:t>
             </a:fld>
             <a:endParaRPr lang="es-ES"/>
           </a:p>
@@ -1980,7 +1986,7 @@
           <a:p>
             <a:fld id="{302CAE88-2E46-472D-AA2C-0CF4CF23A1F6}" type="datetimeFigureOut">
               <a:rPr lang="es-ES" smtClean="0"/>
-              <a:t>01/05/2019</a:t>
+              <a:t>02/05/2019</a:t>
             </a:fld>
             <a:endParaRPr lang="es-ES"/>
           </a:p>
@@ -2098,7 +2104,7 @@
           <a:p>
             <a:fld id="{302CAE88-2E46-472D-AA2C-0CF4CF23A1F6}" type="datetimeFigureOut">
               <a:rPr lang="es-ES" smtClean="0"/>
-              <a:t>01/05/2019</a:t>
+              <a:t>02/05/2019</a:t>
             </a:fld>
             <a:endParaRPr lang="es-ES"/>
           </a:p>
@@ -2269,7 +2275,7 @@
           <a:p>
             <a:fld id="{302CAE88-2E46-472D-AA2C-0CF4CF23A1F6}" type="datetimeFigureOut">
               <a:rPr lang="es-ES" smtClean="0"/>
-              <a:t>01/05/2019</a:t>
+              <a:t>02/05/2019</a:t>
             </a:fld>
             <a:endParaRPr lang="es-ES"/>
           </a:p>
@@ -2623,7 +2629,7 @@
           <a:p>
             <a:fld id="{302CAE88-2E46-472D-AA2C-0CF4CF23A1F6}" type="datetimeFigureOut">
               <a:rPr lang="es-ES" smtClean="0"/>
-              <a:t>01/05/2019</a:t>
+              <a:t>02/05/2019</a:t>
             </a:fld>
             <a:endParaRPr lang="es-ES"/>
           </a:p>
@@ -3005,7 +3011,7 @@
           <a:p>
             <a:fld id="{302CAE88-2E46-472D-AA2C-0CF4CF23A1F6}" type="datetimeFigureOut">
               <a:rPr lang="es-ES" smtClean="0"/>
-              <a:t>01/05/2019</a:t>
+              <a:t>02/05/2019</a:t>
             </a:fld>
             <a:endParaRPr lang="es-ES"/>
           </a:p>
@@ -3292,7 +3298,7 @@
           <a:p>
             <a:fld id="{302CAE88-2E46-472D-AA2C-0CF4CF23A1F6}" type="datetimeFigureOut">
               <a:rPr lang="es-ES" smtClean="0"/>
-              <a:t>01/05/2019</a:t>
+              <a:t>02/05/2019</a:t>
             </a:fld>
             <a:endParaRPr lang="es-ES"/>
           </a:p>
@@ -3984,7 +3990,7 @@
           <p:cNvPr id="2" name="Título 1">
             <a:extLst>
               <a:ext uri="{FF2B5EF4-FFF2-40B4-BE49-F238E27FC236}">
-                <a16:creationId xmlns:a16="http://schemas.microsoft.com/office/drawing/2014/main" id="{5F519D91-D331-450E-A1AC-CEF76E542F9E}"/>
+                <a16:creationId xmlns:a16="http://schemas.microsoft.com/office/drawing/2014/main" id="{7F5CDF1F-8C71-4329-8F1E-E61E94D79E51}"/>
               </a:ext>
             </a:extLst>
           </p:cNvPr>
@@ -4002,7 +4008,7 @@
           <a:p>
             <a:r>
               <a:rPr lang="es-ES" b="1" dirty="0"/>
-              <a:t>Slow Query Log</a:t>
+              <a:t>Sentencia INSERT DELAYED</a:t>
             </a:r>
             <a:endParaRPr lang="es-ES" dirty="0"/>
           </a:p>
@@ -4013,7 +4019,7 @@
           <p:cNvPr id="3" name="Marcador de contenido 2">
             <a:extLst>
               <a:ext uri="{FF2B5EF4-FFF2-40B4-BE49-F238E27FC236}">
-                <a16:creationId xmlns:a16="http://schemas.microsoft.com/office/drawing/2014/main" id="{24CA9BB0-7DA5-460F-B2F3-46999BB42F86}"/>
+                <a16:creationId xmlns:a16="http://schemas.microsoft.com/office/drawing/2014/main" id="{BCE68218-8BB9-4A5C-B7E7-5F91C0406948}"/>
               </a:ext>
             </a:extLst>
           </p:cNvPr>
@@ -4027,12 +4033,12 @@
         <p:spPr>
           <a:xfrm>
             <a:off x="1097280" y="1845733"/>
-            <a:ext cx="10058400" cy="4435425"/>
+            <a:ext cx="10058400" cy="4461063"/>
           </a:xfrm>
         </p:spPr>
         <p:txBody>
           <a:bodyPr>
-            <a:normAutofit fontScale="85000" lnSpcReduction="20000"/>
+            <a:normAutofit fontScale="92500" lnSpcReduction="20000"/>
           </a:bodyPr>
           <a:lstStyle/>
           <a:p>
@@ -4042,7 +4048,7 @@
             </a:pPr>
             <a:r>
               <a:rPr lang="es-ES" dirty="0"/>
-              <a:t>Variable que al activarse sirve para:</a:t>
+              <a:t>Para optimizar sentencias INSERT y mejorar su velocidad</a:t>
             </a:r>
           </a:p>
           <a:p>
@@ -4051,8 +4057,8 @@
               <a:buChar char="§"/>
             </a:pPr>
             <a:r>
-              <a:rPr lang="es-ES" b="1" dirty="0"/>
-              <a:t>Encontrar las sentencias que mayor tiempo de ejecución requieren: principales candidatas para ser optimizadas</a:t>
+              <a:rPr lang="es-ES" dirty="0"/>
+              <a:t>Fusionar múltiples operaciones pequeñas en una sola</a:t>
             </a:r>
           </a:p>
           <a:p>
@@ -4062,7 +4068,17 @@
             </a:pPr>
             <a:r>
               <a:rPr lang="es-ES" dirty="0"/>
-              <a:t>Busca las sentencias que:</a:t>
+              <a:t>Realizar el menor número de conexiones con la tabla donde se van a insertar</a:t>
+            </a:r>
+          </a:p>
+          <a:p>
+            <a:pPr lvl="1">
+              <a:buFont typeface="Wingdings" panose="05000000000000000000" pitchFamily="2" charset="2"/>
+              <a:buChar char="§"/>
+            </a:pPr>
+            <a:r>
+              <a:rPr lang="es-ES" dirty="0"/>
+              <a:t>Mandar el mayor de tuplas de una sola vez retrasando:</a:t>
             </a:r>
           </a:p>
           <a:p>
@@ -4072,7 +4088,7 @@
             </a:pPr>
             <a:r>
               <a:rPr lang="es-ES" dirty="0"/>
-              <a:t>Llevan más de una cantidad de segundos</a:t>
+              <a:t>La actualización de índices</a:t>
             </a:r>
           </a:p>
           <a:p>
@@ -4082,7 +4098,7 @@
             </a:pPr>
             <a:r>
               <a:rPr lang="es-ES" dirty="0"/>
-              <a:t>Requieren de al menos un número concreto de tuplas para ser revisadas</a:t>
+              <a:t>La comprobación de consistencia</a:t>
             </a:r>
           </a:p>
           <a:p>
@@ -4092,15 +4108,7 @@
             </a:pPr>
             <a:r>
               <a:rPr lang="es-ES" dirty="0"/>
-              <a:t>Las sentencias lentas se guardarán para poder ser revisadas, por defecto en </a:t>
-            </a:r>
-            <a:r>
-              <a:rPr lang="es-ES" i="1" dirty="0"/>
-              <a:t>nombre_host</a:t>
-            </a:r>
-            <a:r>
-              <a:rPr lang="es-ES" dirty="0"/>
-              <a:t>-slow.log </a:t>
+              <a:t>Usar sentencias INSERT con múltiples listas de VALUE</a:t>
             </a:r>
           </a:p>
           <a:p>
@@ -4110,7 +4118,17 @@
             </a:pPr>
             <a:r>
               <a:rPr lang="es-ES" dirty="0"/>
-              <a:t>La variable de estado slow queries se incrementa por cada sentencia lenta</a:t>
+              <a:t>Usar LOAD DATA cuando se cargue una tabla de un archivo de texto</a:t>
+            </a:r>
+          </a:p>
+          <a:p>
+            <a:pPr lvl="1">
+              <a:buFont typeface="Wingdings" panose="05000000000000000000" pitchFamily="2" charset="2"/>
+              <a:buChar char="§"/>
+            </a:pPr>
+            <a:r>
+              <a:rPr lang="es-ES" dirty="0"/>
+              <a:t>Insertar valores solo cuando el valor a insertar es distinto del valor por defecto de la columna</a:t>
             </a:r>
           </a:p>
           <a:p>
@@ -4120,7 +4138,7 @@
             </a:pPr>
             <a:r>
               <a:rPr lang="es-ES" dirty="0"/>
-              <a:t>Lo que encontraremos en el log</a:t>
+              <a:t>Opción DELAYED</a:t>
             </a:r>
           </a:p>
           <a:p>
@@ -4130,7 +4148,7 @@
             </a:pPr>
             <a:r>
               <a:rPr lang="es-ES" dirty="0"/>
-              <a:t>Sentencia ejecutada</a:t>
+              <a:t>Extensión de MySQL al estándar SQL</a:t>
             </a:r>
           </a:p>
           <a:p>
@@ -4140,7 +4158,7 @@
             </a:pPr>
             <a:r>
               <a:rPr lang="es-ES" dirty="0"/>
-              <a:t>Línea el tiempo de ejecución de la sentencia</a:t>
+              <a:t>Obsoleta desde MySQL 5.6</a:t>
             </a:r>
           </a:p>
           <a:p>
@@ -4149,8 +4167,8 @@
               <a:buChar char="§"/>
             </a:pPr>
             <a:r>
-              <a:rPr lang="es-ES" dirty="0"/>
-              <a:t>Tiempo de bloqueo</a:t>
+              <a:rPr lang="es-ES" b="1" dirty="0"/>
+              <a:t>Cuando un cliente usaba esta sentencia sobre una tabla, la tupla se almacenaba en una cola para insertarse cuando esta tabla no estuviera en uso</a:t>
             </a:r>
           </a:p>
           <a:p>
@@ -4160,7 +4178,7 @@
             </a:pPr>
             <a:r>
               <a:rPr lang="es-ES" dirty="0"/>
-              <a:t>Tuplas examinadas</a:t>
+              <a:t>En MySQL 8.0 el servidor reconoce la opción DELAYED, pero la ignora</a:t>
             </a:r>
           </a:p>
           <a:p>
@@ -4170,62 +4188,15 @@
             </a:pPr>
             <a:r>
               <a:rPr lang="es-ES" dirty="0"/>
-              <a:t>Tuplas que se han mandado al cliente</a:t>
-            </a:r>
-          </a:p>
-          <a:p>
-            <a:pPr>
-              <a:buFont typeface="Wingdings" panose="05000000000000000000" pitchFamily="2" charset="2"/>
-              <a:buChar char="q"/>
-            </a:pPr>
-            <a:r>
-              <a:rPr lang="es-ES" dirty="0"/>
-              <a:t>Si activamos la variable log slow extra aparecerían en el log muchos más datos de la sentencia, entre otros:</a:t>
-            </a:r>
-          </a:p>
-          <a:p>
-            <a:pPr lvl="1">
-              <a:buFont typeface="Wingdings" panose="05000000000000000000" pitchFamily="2" charset="2"/>
-              <a:buChar char="§"/>
-            </a:pPr>
-            <a:r>
-              <a:rPr lang="es-ES" dirty="0"/>
-              <a:t>Número de error que produce</a:t>
-            </a:r>
-          </a:p>
-          <a:p>
-            <a:pPr lvl="1">
-              <a:buFont typeface="Wingdings" panose="05000000000000000000" pitchFamily="2" charset="2"/>
-              <a:buChar char="§"/>
-            </a:pPr>
-            <a:r>
-              <a:rPr lang="es-ES" dirty="0"/>
-              <a:t>Bytes recibidos</a:t>
-            </a:r>
-          </a:p>
-          <a:p>
-            <a:pPr lvl="1">
-              <a:buFont typeface="Wingdings" panose="05000000000000000000" pitchFamily="2" charset="2"/>
-              <a:buChar char="§"/>
-            </a:pPr>
-            <a:r>
-              <a:rPr lang="es-ES" dirty="0"/>
-              <a:t>Hora en la que empezó y acabó</a:t>
-            </a:r>
-          </a:p>
-          <a:p>
-            <a:pPr lvl="1">
-              <a:buFont typeface="Wingdings" panose="05000000000000000000" pitchFamily="2" charset="2"/>
-              <a:buChar char="q"/>
-            </a:pPr>
-            <a:endParaRPr lang="es-ES" dirty="0"/>
+              <a:t>Se planea eliminar esta palabra reservada</a:t>
+            </a:r>
           </a:p>
         </p:txBody>
       </p:sp>
     </p:spTree>
     <p:extLst>
       <p:ext uri="{BB962C8B-B14F-4D97-AF65-F5344CB8AC3E}">
-        <p14:creationId xmlns:p14="http://schemas.microsoft.com/office/powerpoint/2010/main" val="2791882359"/>
+        <p14:creationId xmlns:p14="http://schemas.microsoft.com/office/powerpoint/2010/main" val="730295487"/>
       </p:ext>
     </p:extLst>
   </p:cSld>
@@ -4257,7 +4228,7 @@
           <p:cNvPr id="2" name="Título 1">
             <a:extLst>
               <a:ext uri="{FF2B5EF4-FFF2-40B4-BE49-F238E27FC236}">
-                <a16:creationId xmlns:a16="http://schemas.microsoft.com/office/drawing/2014/main" id="{AB983BA5-DD8A-4218-87E2-4031B0A94437}"/>
+                <a16:creationId xmlns:a16="http://schemas.microsoft.com/office/drawing/2014/main" id="{5F519D91-D331-450E-A1AC-CEF76E542F9E}"/>
               </a:ext>
             </a:extLst>
           </p:cNvPr>
@@ -4275,7 +4246,7 @@
           <a:p>
             <a:r>
               <a:rPr lang="es-ES" b="1" dirty="0"/>
-              <a:t>Variables de sistema: long-query-time</a:t>
+              <a:t>Slow Query Log</a:t>
             </a:r>
             <a:endParaRPr lang="es-ES" dirty="0"/>
           </a:p>
@@ -4286,7 +4257,7 @@
           <p:cNvPr id="3" name="Marcador de contenido 2">
             <a:extLst>
               <a:ext uri="{FF2B5EF4-FFF2-40B4-BE49-F238E27FC236}">
-                <a16:creationId xmlns:a16="http://schemas.microsoft.com/office/drawing/2014/main" id="{D32D0087-47D5-4AD4-A595-4C2BE4A2CB8A}"/>
+                <a16:creationId xmlns:a16="http://schemas.microsoft.com/office/drawing/2014/main" id="{24CA9BB0-7DA5-460F-B2F3-46999BB42F86}"/>
               </a:ext>
             </a:extLst>
           </p:cNvPr>
@@ -4297,9 +4268,16 @@
             <p:ph idx="1"/>
           </p:nvPr>
         </p:nvSpPr>
-        <p:spPr/>
-        <p:txBody>
-          <a:bodyPr/>
+        <p:spPr>
+          <a:xfrm>
+            <a:off x="1097280" y="1845733"/>
+            <a:ext cx="10058400" cy="4435425"/>
+          </a:xfrm>
+        </p:spPr>
+        <p:txBody>
+          <a:bodyPr>
+            <a:normAutofit fontScale="85000" lnSpcReduction="20000"/>
+          </a:bodyPr>
           <a:lstStyle/>
           <a:p>
             <a:pPr>
@@ -4308,7 +4286,75 @@
             </a:pPr>
             <a:r>
               <a:rPr lang="es-ES" dirty="0"/>
-              <a:t>Relacionada íntimamente con la variable slow query log</a:t>
+              <a:t>Variable que al activarse sirve para:</a:t>
+            </a:r>
+          </a:p>
+          <a:p>
+            <a:pPr lvl="1">
+              <a:buFont typeface="Wingdings" panose="05000000000000000000" pitchFamily="2" charset="2"/>
+              <a:buChar char="§"/>
+            </a:pPr>
+            <a:r>
+              <a:rPr lang="es-ES" b="1" dirty="0"/>
+              <a:t>Encontrar las sentencias que mayor tiempo de ejecución requieren: principales candidatas para ser optimizadas</a:t>
+            </a:r>
+          </a:p>
+          <a:p>
+            <a:pPr lvl="1">
+              <a:buFont typeface="Wingdings" panose="05000000000000000000" pitchFamily="2" charset="2"/>
+              <a:buChar char="§"/>
+            </a:pPr>
+            <a:r>
+              <a:rPr lang="es-ES" dirty="0"/>
+              <a:t>Busca las sentencias que:</a:t>
+            </a:r>
+          </a:p>
+          <a:p>
+            <a:pPr lvl="2">
+              <a:buFont typeface="Arial" panose="020B0604020202020204" pitchFamily="34" charset="0"/>
+              <a:buChar char="•"/>
+            </a:pPr>
+            <a:r>
+              <a:rPr lang="es-ES" dirty="0"/>
+              <a:t>Llevan más de una cantidad de segundos</a:t>
+            </a:r>
+          </a:p>
+          <a:p>
+            <a:pPr lvl="2">
+              <a:buFont typeface="Arial" panose="020B0604020202020204" pitchFamily="34" charset="0"/>
+              <a:buChar char="•"/>
+            </a:pPr>
+            <a:r>
+              <a:rPr lang="es-ES" dirty="0"/>
+              <a:t>Requieren de al menos un número concreto de tuplas para ser revisadas</a:t>
+            </a:r>
+          </a:p>
+          <a:p>
+            <a:pPr lvl="1">
+              <a:buFont typeface="Wingdings" panose="05000000000000000000" pitchFamily="2" charset="2"/>
+              <a:buChar char="§"/>
+            </a:pPr>
+            <a:r>
+              <a:rPr lang="es-ES" dirty="0"/>
+              <a:t>Las sentencias lentas se guardarán para poder ser revisadas, por defecto en </a:t>
+            </a:r>
+            <a:r>
+              <a:rPr lang="es-ES" i="1" dirty="0"/>
+              <a:t>nombre_host</a:t>
+            </a:r>
+            <a:r>
+              <a:rPr lang="es-ES" dirty="0"/>
+              <a:t>-slow.log </a:t>
+            </a:r>
+          </a:p>
+          <a:p>
+            <a:pPr lvl="1">
+              <a:buFont typeface="Wingdings" panose="05000000000000000000" pitchFamily="2" charset="2"/>
+              <a:buChar char="§"/>
+            </a:pPr>
+            <a:r>
+              <a:rPr lang="es-ES" dirty="0"/>
+              <a:t>La variable de estado slow queries se incrementa por cada sentencia lenta</a:t>
             </a:r>
           </a:p>
           <a:p>
@@ -4317,8 +4363,58 @@
               <a:buChar char="q"/>
             </a:pPr>
             <a:r>
-              <a:rPr lang="es-ES" b="1" dirty="0"/>
-              <a:t>Número mínimo de segundos que tardarán en ejecutarse las sentencias que se guardarán en el log</a:t>
+              <a:rPr lang="es-ES" dirty="0"/>
+              <a:t>Lo que encontraremos en el log</a:t>
+            </a:r>
+          </a:p>
+          <a:p>
+            <a:pPr lvl="1">
+              <a:buFont typeface="Wingdings" panose="05000000000000000000" pitchFamily="2" charset="2"/>
+              <a:buChar char="§"/>
+            </a:pPr>
+            <a:r>
+              <a:rPr lang="es-ES" dirty="0"/>
+              <a:t>Sentencia ejecutada</a:t>
+            </a:r>
+          </a:p>
+          <a:p>
+            <a:pPr lvl="1">
+              <a:buFont typeface="Wingdings" panose="05000000000000000000" pitchFamily="2" charset="2"/>
+              <a:buChar char="§"/>
+            </a:pPr>
+            <a:r>
+              <a:rPr lang="es-ES" dirty="0"/>
+              <a:t>Línea el tiempo de ejecución de la sentencia</a:t>
+            </a:r>
+          </a:p>
+          <a:p>
+            <a:pPr lvl="1">
+              <a:buFont typeface="Wingdings" panose="05000000000000000000" pitchFamily="2" charset="2"/>
+              <a:buChar char="§"/>
+            </a:pPr>
+            <a:r>
+              <a:rPr lang="es-ES" dirty="0"/>
+              <a:t>Tiempo de bloqueo</a:t>
+            </a:r>
+          </a:p>
+          <a:p>
+            <a:pPr lvl="1">
+              <a:buFont typeface="Wingdings" panose="05000000000000000000" pitchFamily="2" charset="2"/>
+              <a:buChar char="§"/>
+            </a:pPr>
+            <a:r>
+              <a:rPr lang="es-ES" dirty="0"/>
+              <a:t>Tuplas examinadas</a:t>
+            </a:r>
+          </a:p>
+          <a:p>
+            <a:pPr lvl="1">
+              <a:buFont typeface="Wingdings" panose="05000000000000000000" pitchFamily="2" charset="2"/>
+              <a:buChar char="§"/>
+            </a:pPr>
+            <a:r>
+              <a:rPr lang="es-ES" dirty="0"/>
+              <a:t>Tuplas que se han mandado al cliente</a:t>
             </a:r>
           </a:p>
           <a:p>
@@ -4328,7 +4424,7 @@
             </a:pPr>
             <a:r>
               <a:rPr lang="es-ES" dirty="0"/>
-              <a:t>Valores que recibe</a:t>
+              <a:t>Si activamos la variable log slow extra aparecerían en el log muchos más datos de la sentencia, entre otros:</a:t>
             </a:r>
           </a:p>
           <a:p>
@@ -4338,7 +4434,7 @@
             </a:pPr>
             <a:r>
               <a:rPr lang="es-ES" dirty="0"/>
-              <a:t>Por defecto: 10 segundos</a:t>
+              <a:t>Número de error que produce</a:t>
             </a:r>
           </a:p>
           <a:p>
@@ -4348,7 +4444,7 @@
             </a:pPr>
             <a:r>
               <a:rPr lang="es-ES" dirty="0"/>
-              <a:t>Mínimo: 0</a:t>
+              <a:t>Bytes recibidos</a:t>
             </a:r>
           </a:p>
           <a:p>
@@ -4358,45 +4454,22 @@
             </a:pPr>
             <a:r>
               <a:rPr lang="es-ES" dirty="0"/>
-              <a:t>Se puede especificar en microsegundos </a:t>
-            </a:r>
-          </a:p>
-          <a:p>
-            <a:pPr>
+              <a:t>Hora en la que empezó y acabó</a:t>
+            </a:r>
+          </a:p>
+          <a:p>
+            <a:pPr lvl="1">
               <a:buFont typeface="Wingdings" panose="05000000000000000000" pitchFamily="2" charset="2"/>
               <a:buChar char="q"/>
             </a:pPr>
-            <a:r>
-              <a:rPr lang="es-ES" dirty="0"/>
-              <a:t>Este valor se compara en tiempo de ejecución, no de procesado, por lo tanto:</a:t>
-            </a:r>
-          </a:p>
-          <a:p>
-            <a:pPr lvl="1">
-              <a:buFont typeface="Wingdings" panose="05000000000000000000" pitchFamily="2" charset="2"/>
-              <a:buChar char="§"/>
-            </a:pPr>
-            <a:r>
-              <a:rPr lang="es-ES" dirty="0"/>
-              <a:t>Sentencia está por debajo del umbral en un sistema con poca carga</a:t>
-            </a:r>
-          </a:p>
-          <a:p>
-            <a:pPr lvl="1">
-              <a:buFont typeface="Wingdings" panose="05000000000000000000" pitchFamily="2" charset="2"/>
-              <a:buChar char="§"/>
-            </a:pPr>
-            <a:r>
-              <a:rPr lang="es-ES" dirty="0"/>
-              <a:t>Esa sentencia podría superar ese umbral en un sistema con una carga mayor</a:t>
-            </a:r>
+            <a:endParaRPr lang="es-ES" dirty="0"/>
           </a:p>
         </p:txBody>
       </p:sp>
     </p:spTree>
     <p:extLst>
       <p:ext uri="{BB962C8B-B14F-4D97-AF65-F5344CB8AC3E}">
-        <p14:creationId xmlns:p14="http://schemas.microsoft.com/office/powerpoint/2010/main" val="1506244569"/>
+        <p14:creationId xmlns:p14="http://schemas.microsoft.com/office/powerpoint/2010/main" val="2791882359"/>
       </p:ext>
     </p:extLst>
   </p:cSld>
@@ -4428,6 +4501,177 @@
           <p:cNvPr id="2" name="Título 1">
             <a:extLst>
               <a:ext uri="{FF2B5EF4-FFF2-40B4-BE49-F238E27FC236}">
+                <a16:creationId xmlns:a16="http://schemas.microsoft.com/office/drawing/2014/main" id="{AB983BA5-DD8A-4218-87E2-4031B0A94437}"/>
+              </a:ext>
+            </a:extLst>
+          </p:cNvPr>
+          <p:cNvSpPr>
+            <a:spLocks noGrp="1"/>
+          </p:cNvSpPr>
+          <p:nvPr>
+            <p:ph type="title"/>
+          </p:nvPr>
+        </p:nvSpPr>
+        <p:spPr/>
+        <p:txBody>
+          <a:bodyPr/>
+          <a:lstStyle/>
+          <a:p>
+            <a:r>
+              <a:rPr lang="es-ES" b="1" dirty="0"/>
+              <a:t>Variables de sistema: long-query-time</a:t>
+            </a:r>
+            <a:endParaRPr lang="es-ES" dirty="0"/>
+          </a:p>
+        </p:txBody>
+      </p:sp>
+      <p:sp>
+        <p:nvSpPr>
+          <p:cNvPr id="3" name="Marcador de contenido 2">
+            <a:extLst>
+              <a:ext uri="{FF2B5EF4-FFF2-40B4-BE49-F238E27FC236}">
+                <a16:creationId xmlns:a16="http://schemas.microsoft.com/office/drawing/2014/main" id="{D32D0087-47D5-4AD4-A595-4C2BE4A2CB8A}"/>
+              </a:ext>
+            </a:extLst>
+          </p:cNvPr>
+          <p:cNvSpPr>
+            <a:spLocks noGrp="1"/>
+          </p:cNvSpPr>
+          <p:nvPr>
+            <p:ph idx="1"/>
+          </p:nvPr>
+        </p:nvSpPr>
+        <p:spPr/>
+        <p:txBody>
+          <a:bodyPr/>
+          <a:lstStyle/>
+          <a:p>
+            <a:pPr>
+              <a:buFont typeface="Wingdings" panose="05000000000000000000" pitchFamily="2" charset="2"/>
+              <a:buChar char="q"/>
+            </a:pPr>
+            <a:r>
+              <a:rPr lang="es-ES" dirty="0"/>
+              <a:t>Relacionada íntimamente con la variable slow query log</a:t>
+            </a:r>
+          </a:p>
+          <a:p>
+            <a:pPr>
+              <a:buFont typeface="Wingdings" panose="05000000000000000000" pitchFamily="2" charset="2"/>
+              <a:buChar char="q"/>
+            </a:pPr>
+            <a:r>
+              <a:rPr lang="es-ES" b="1" dirty="0"/>
+              <a:t>Número mínimo de segundos que tardarán en ejecutarse las sentencias que se guardarán en el log</a:t>
+            </a:r>
+          </a:p>
+          <a:p>
+            <a:pPr>
+              <a:buFont typeface="Wingdings" panose="05000000000000000000" pitchFamily="2" charset="2"/>
+              <a:buChar char="q"/>
+            </a:pPr>
+            <a:r>
+              <a:rPr lang="es-ES" dirty="0"/>
+              <a:t>Valores que recibe</a:t>
+            </a:r>
+          </a:p>
+          <a:p>
+            <a:pPr lvl="1">
+              <a:buFont typeface="Wingdings" panose="05000000000000000000" pitchFamily="2" charset="2"/>
+              <a:buChar char="§"/>
+            </a:pPr>
+            <a:r>
+              <a:rPr lang="es-ES" dirty="0"/>
+              <a:t>Por defecto: 10 segundos</a:t>
+            </a:r>
+          </a:p>
+          <a:p>
+            <a:pPr lvl="1">
+              <a:buFont typeface="Wingdings" panose="05000000000000000000" pitchFamily="2" charset="2"/>
+              <a:buChar char="§"/>
+            </a:pPr>
+            <a:r>
+              <a:rPr lang="es-ES" dirty="0"/>
+              <a:t>Mínimo: 0</a:t>
+            </a:r>
+          </a:p>
+          <a:p>
+            <a:pPr lvl="1">
+              <a:buFont typeface="Wingdings" panose="05000000000000000000" pitchFamily="2" charset="2"/>
+              <a:buChar char="§"/>
+            </a:pPr>
+            <a:r>
+              <a:rPr lang="es-ES" dirty="0"/>
+              <a:t>Se puede especificar en microsegundos </a:t>
+            </a:r>
+          </a:p>
+          <a:p>
+            <a:pPr>
+              <a:buFont typeface="Wingdings" panose="05000000000000000000" pitchFamily="2" charset="2"/>
+              <a:buChar char="q"/>
+            </a:pPr>
+            <a:r>
+              <a:rPr lang="es-ES" dirty="0"/>
+              <a:t>Este valor se compara en tiempo de ejecución, no de procesado, por lo tanto:</a:t>
+            </a:r>
+          </a:p>
+          <a:p>
+            <a:pPr lvl="1">
+              <a:buFont typeface="Wingdings" panose="05000000000000000000" pitchFamily="2" charset="2"/>
+              <a:buChar char="§"/>
+            </a:pPr>
+            <a:r>
+              <a:rPr lang="es-ES" dirty="0"/>
+              <a:t>Sentencia está por debajo del umbral en un sistema con poca carga</a:t>
+            </a:r>
+          </a:p>
+          <a:p>
+            <a:pPr lvl="1">
+              <a:buFont typeface="Wingdings" panose="05000000000000000000" pitchFamily="2" charset="2"/>
+              <a:buChar char="§"/>
+            </a:pPr>
+            <a:r>
+              <a:rPr lang="es-ES" dirty="0"/>
+              <a:t>Esa sentencia podría superar ese umbral en un sistema con una carga mayor</a:t>
+            </a:r>
+          </a:p>
+        </p:txBody>
+      </p:sp>
+    </p:spTree>
+    <p:extLst>
+      <p:ext uri="{BB962C8B-B14F-4D97-AF65-F5344CB8AC3E}">
+        <p14:creationId xmlns:p14="http://schemas.microsoft.com/office/powerpoint/2010/main" val="1506244569"/>
+      </p:ext>
+    </p:extLst>
+  </p:cSld>
+  <p:clrMapOvr>
+    <a:masterClrMapping/>
+  </p:clrMapOvr>
+</p:sld>
+</file>
+
+<file path=ppt/slides/slide13.xml><?xml version="1.0" encoding="utf-8"?>
+<p:sld xmlns:a="http://schemas.openxmlformats.org/drawingml/2006/main" xmlns:r="http://schemas.openxmlformats.org/officeDocument/2006/relationships" xmlns:p="http://schemas.openxmlformats.org/presentationml/2006/main">
+  <p:cSld>
+    <p:spTree>
+      <p:nvGrpSpPr>
+        <p:cNvPr id="1" name=""/>
+        <p:cNvGrpSpPr/>
+        <p:nvPr/>
+      </p:nvGrpSpPr>
+      <p:grpSpPr>
+        <a:xfrm>
+          <a:off x="0" y="0"/>
+          <a:ext cx="0" cy="0"/>
+          <a:chOff x="0" y="0"/>
+          <a:chExt cx="0" cy="0"/>
+        </a:xfrm>
+      </p:grpSpPr>
+      <p:sp>
+        <p:nvSpPr>
+          <p:cNvPr id="2" name="Título 1">
+            <a:extLst>
+              <a:ext uri="{FF2B5EF4-FFF2-40B4-BE49-F238E27FC236}">
                 <a16:creationId xmlns:a16="http://schemas.microsoft.com/office/drawing/2014/main" id="{9885B729-559B-4B71-BEAD-1296C3648D64}"/>
               </a:ext>
             </a:extLst>
@@ -4630,7 +4874,7 @@
 </p:sld>
 </file>
 
-<file path=ppt/slides/slide13.xml><?xml version="1.0" encoding="utf-8"?>
+<file path=ppt/slides/slide14.xml><?xml version="1.0" encoding="utf-8"?>
 <p:sld xmlns:a="http://schemas.openxmlformats.org/drawingml/2006/main" xmlns:r="http://schemas.openxmlformats.org/officeDocument/2006/relationships" xmlns:p="http://schemas.openxmlformats.org/presentationml/2006/main">
   <p:cSld>
     <p:spTree>
@@ -5159,10 +5403,185 @@
           <a:bodyPr/>
           <a:lstStyle/>
           <a:p>
-            <a:endParaRPr lang="es-ES"/>
-          </a:p>
-        </p:txBody>
-      </p:sp>
+            <a:pPr lvl="1">
+              <a:buFont typeface="Wingdings" panose="05000000000000000000" pitchFamily="2" charset="2"/>
+              <a:buChar char="q"/>
+            </a:pPr>
+            <a:r>
+              <a:rPr lang="es-ES" dirty="0"/>
+              <a:t>La sentencia EXPLAIN proporciona información sobre como MySQL ejecuta sentencias, en concreto las sentencias SELECT, DELETE, INSERT, REPLACE y UPDATE.</a:t>
+            </a:r>
+          </a:p>
+          <a:p>
+            <a:pPr lvl="1">
+              <a:buFont typeface="Wingdings" panose="05000000000000000000" pitchFamily="2" charset="2"/>
+              <a:buChar char="q"/>
+            </a:pPr>
+            <a:endParaRPr lang="es-ES" dirty="0"/>
+          </a:p>
+          <a:p>
+            <a:pPr lvl="2">
+              <a:buFont typeface="Wingdings" panose="05000000000000000000" pitchFamily="2" charset="2"/>
+              <a:buChar char="§"/>
+            </a:pPr>
+            <a:r>
+              <a:rPr lang="es-ES" dirty="0"/>
+              <a:t>La salida de esta sentencia tiene el siguiente formato:</a:t>
+            </a:r>
+          </a:p>
+          <a:p>
+            <a:pPr lvl="2">
+              <a:buFont typeface="Wingdings" panose="05000000000000000000" pitchFamily="2" charset="2"/>
+              <a:buChar char="§"/>
+            </a:pPr>
+            <a:endParaRPr lang="es-ES" dirty="0"/>
+          </a:p>
+          <a:p>
+            <a:pPr lvl="2">
+              <a:buFont typeface="Wingdings" panose="05000000000000000000" pitchFamily="2" charset="2"/>
+              <a:buChar char="§"/>
+            </a:pPr>
+            <a:endParaRPr lang="es-ES" dirty="0"/>
+          </a:p>
+          <a:p>
+            <a:pPr lvl="2">
+              <a:buFont typeface="Wingdings" panose="05000000000000000000" pitchFamily="2" charset="2"/>
+              <a:buChar char="§"/>
+            </a:pPr>
+            <a:endParaRPr lang="es-ES" dirty="0"/>
+          </a:p>
+          <a:p>
+            <a:pPr lvl="2">
+              <a:buFont typeface="Wingdings" panose="05000000000000000000" pitchFamily="2" charset="2"/>
+              <a:buChar char="§"/>
+            </a:pPr>
+            <a:endParaRPr lang="es-ES" dirty="0"/>
+          </a:p>
+          <a:p>
+            <a:pPr lvl="2">
+              <a:buFont typeface="Wingdings" panose="05000000000000000000" pitchFamily="2" charset="2"/>
+              <a:buChar char="§"/>
+            </a:pPr>
+            <a:endParaRPr lang="es-ES" dirty="0"/>
+          </a:p>
+          <a:p>
+            <a:pPr lvl="2">
+              <a:buFont typeface="Wingdings" panose="05000000000000000000" pitchFamily="2" charset="2"/>
+              <a:buChar char="§"/>
+            </a:pPr>
+            <a:endParaRPr lang="es-ES" dirty="0"/>
+          </a:p>
+          <a:p>
+            <a:pPr lvl="2">
+              <a:buFont typeface="Wingdings" panose="05000000000000000000" pitchFamily="2" charset="2"/>
+              <a:buChar char="§"/>
+            </a:pPr>
+            <a:endParaRPr lang="es-ES" dirty="0"/>
+          </a:p>
+          <a:p>
+            <a:pPr lvl="2">
+              <a:buFont typeface="Wingdings" panose="05000000000000000000" pitchFamily="2" charset="2"/>
+              <a:buChar char="§"/>
+            </a:pPr>
+            <a:endParaRPr lang="es-ES" dirty="0"/>
+          </a:p>
+          <a:p>
+            <a:pPr lvl="2">
+              <a:buFont typeface="Wingdings" panose="05000000000000000000" pitchFamily="2" charset="2"/>
+              <a:buChar char="§"/>
+            </a:pPr>
+            <a:r>
+              <a:rPr lang="es-ES" dirty="0"/>
+              <a:t>Interpretar esta tabla nos puede dar la clave para mejorar manualmente las consultas. </a:t>
+            </a:r>
+          </a:p>
+          <a:p>
+            <a:pPr lvl="2">
+              <a:buFont typeface="Wingdings" panose="05000000000000000000" pitchFamily="2" charset="2"/>
+              <a:buChar char="§"/>
+            </a:pPr>
+            <a:r>
+              <a:rPr lang="es-ES" dirty="0"/>
+              <a:t>Las columnas más importantes de cara a la optimización son </a:t>
+            </a:r>
+            <a:r>
+              <a:rPr lang="es-ES" dirty="0" err="1"/>
+              <a:t>Type</a:t>
+            </a:r>
+            <a:r>
+              <a:rPr lang="es-ES" dirty="0"/>
+              <a:t> (tipo de </a:t>
+            </a:r>
+            <a:r>
+              <a:rPr lang="es-ES" dirty="0" err="1"/>
+              <a:t>join</a:t>
+            </a:r>
+            <a:r>
+              <a:rPr lang="es-ES" dirty="0"/>
+              <a:t>) y </a:t>
+            </a:r>
+            <a:r>
+              <a:rPr lang="es-ES" dirty="0" err="1"/>
+              <a:t>rows</a:t>
+            </a:r>
+            <a:r>
+              <a:rPr lang="es-ES" dirty="0"/>
+              <a:t> (filas involucradas).</a:t>
+            </a:r>
+          </a:p>
+          <a:p>
+            <a:pPr marL="201168" lvl="1" indent="0">
+              <a:buNone/>
+            </a:pPr>
+            <a:endParaRPr lang="es-ES" dirty="0"/>
+          </a:p>
+          <a:p>
+            <a:pPr marL="201168" lvl="1" indent="0">
+              <a:buNone/>
+            </a:pPr>
+            <a:endParaRPr lang="es-ES" dirty="0"/>
+          </a:p>
+        </p:txBody>
+      </p:sp>
+      <p:pic>
+        <p:nvPicPr>
+          <p:cNvPr id="4" name="Imagen 3">
+            <a:extLst>
+              <a:ext uri="{FF2B5EF4-FFF2-40B4-BE49-F238E27FC236}">
+                <a16:creationId xmlns:a16="http://schemas.microsoft.com/office/drawing/2014/main" id="{BA7ABD17-C5FA-4226-8591-9A177E0F36DF}"/>
+              </a:ext>
+            </a:extLst>
+          </p:cNvPr>
+          <p:cNvPicPr/>
+          <p:nvPr/>
+        </p:nvPicPr>
+        <p:blipFill>
+          <a:blip r:embed="rId2">
+            <a:extLst>
+              <a:ext uri="{28A0092B-C50C-407E-A947-70E740481C1C}">
+                <a14:useLocalDpi xmlns:a14="http://schemas.microsoft.com/office/drawing/2010/main" val="0"/>
+              </a:ext>
+            </a:extLst>
+          </a:blip>
+          <a:srcRect/>
+          <a:stretch>
+            <a:fillRect/>
+          </a:stretch>
+        </p:blipFill>
+        <p:spPr bwMode="auto">
+          <a:xfrm>
+            <a:off x="3849052" y="3046325"/>
+            <a:ext cx="4493895" cy="2056130"/>
+          </a:xfrm>
+          <a:prstGeom prst="rect">
+            <a:avLst/>
+          </a:prstGeom>
+          <a:noFill/>
+          <a:ln>
+            <a:noFill/>
+          </a:ln>
+        </p:spPr>
+      </p:pic>
     </p:spTree>
     <p:extLst>
       <p:ext uri="{BB962C8B-B14F-4D97-AF65-F5344CB8AC3E}">
@@ -5195,6 +5614,165 @@
       </p:grpSpPr>
       <p:sp>
         <p:nvSpPr>
+          <p:cNvPr id="3" name="Marcador de contenido 2">
+            <a:extLst>
+              <a:ext uri="{FF2B5EF4-FFF2-40B4-BE49-F238E27FC236}">
+                <a16:creationId xmlns:a16="http://schemas.microsoft.com/office/drawing/2014/main" id="{2EBD26EF-694E-4D4A-A695-6AFA1ACBA748}"/>
+              </a:ext>
+            </a:extLst>
+          </p:cNvPr>
+          <p:cNvSpPr>
+            <a:spLocks noGrp="1"/>
+          </p:cNvSpPr>
+          <p:nvPr>
+            <p:ph idx="1"/>
+          </p:nvPr>
+        </p:nvSpPr>
+        <p:spPr>
+          <a:xfrm>
+            <a:off x="892699" y="959211"/>
+            <a:ext cx="10161381" cy="5345311"/>
+          </a:xfrm>
+          <a:solidFill>
+            <a:schemeClr val="bg1"/>
+          </a:solidFill>
+        </p:spPr>
+        <p:txBody>
+          <a:bodyPr/>
+          <a:lstStyle/>
+          <a:p>
+            <a:pPr lvl="1">
+              <a:buFont typeface="Wingdings" panose="05000000000000000000" pitchFamily="2" charset="2"/>
+              <a:buChar char="q"/>
+            </a:pPr>
+            <a:endParaRPr lang="es-ES" dirty="0"/>
+          </a:p>
+          <a:p>
+            <a:pPr lvl="1">
+              <a:buFont typeface="Wingdings" panose="05000000000000000000" pitchFamily="2" charset="2"/>
+              <a:buChar char="q"/>
+            </a:pPr>
+            <a:endParaRPr lang="es-ES" dirty="0"/>
+          </a:p>
+          <a:p>
+            <a:pPr lvl="1">
+              <a:buFont typeface="Wingdings" panose="05000000000000000000" pitchFamily="2" charset="2"/>
+              <a:buChar char="q"/>
+            </a:pPr>
+            <a:r>
+              <a:rPr lang="es-ES" dirty="0"/>
+              <a:t>Gracias a esta sentencia podremos comprobar si el plan propuesto para esta consulta es correcto o necesita de optimización</a:t>
+            </a:r>
+          </a:p>
+          <a:p>
+            <a:pPr lvl="1">
+              <a:buFont typeface="Wingdings" panose="05000000000000000000" pitchFamily="2" charset="2"/>
+              <a:buChar char="q"/>
+            </a:pPr>
+            <a:endParaRPr lang="es-ES" dirty="0"/>
+          </a:p>
+          <a:p>
+            <a:pPr lvl="1">
+              <a:buFont typeface="Wingdings" panose="05000000000000000000" pitchFamily="2" charset="2"/>
+              <a:buChar char="q"/>
+            </a:pPr>
+            <a:r>
+              <a:rPr lang="es-ES" dirty="0"/>
+              <a:t>Si ejecutamos la sentencia SHOW WARNINGS justo después de una sentencia EXPLAIN el optimizador aportará información extra sobre nuestra consulta. La salida de esta sentencia consta de: </a:t>
+            </a:r>
+          </a:p>
+          <a:p>
+            <a:pPr lvl="2">
+              <a:buFont typeface="Wingdings" panose="05000000000000000000" pitchFamily="2" charset="2"/>
+              <a:buChar char="§"/>
+            </a:pPr>
+            <a:endParaRPr lang="es-ES" dirty="0"/>
+          </a:p>
+          <a:p>
+            <a:pPr lvl="2">
+              <a:buFont typeface="Wingdings" panose="05000000000000000000" pitchFamily="2" charset="2"/>
+              <a:buChar char="§"/>
+            </a:pPr>
+            <a:r>
+              <a:rPr lang="es-ES" dirty="0"/>
+              <a:t>Calificación sobre el nombre de las tablas y columnas relacionadas con la consulta.</a:t>
+            </a:r>
+          </a:p>
+          <a:p>
+            <a:pPr lvl="2">
+              <a:buFont typeface="Wingdings" panose="05000000000000000000" pitchFamily="2" charset="2"/>
+              <a:buChar char="§"/>
+            </a:pPr>
+            <a:endParaRPr lang="es-ES" dirty="0"/>
+          </a:p>
+          <a:p>
+            <a:pPr lvl="2">
+              <a:buFont typeface="Wingdings" panose="05000000000000000000" pitchFamily="2" charset="2"/>
+              <a:buChar char="§"/>
+            </a:pPr>
+            <a:r>
+              <a:rPr lang="es-ES" dirty="0"/>
+              <a:t>Nos muestra la apariencia que tendría nuestra consulta tras una reescritura y la aplicación de los criterios de optimización sugeridos.</a:t>
+            </a:r>
+          </a:p>
+          <a:p>
+            <a:pPr lvl="2">
+              <a:buFont typeface="Wingdings" panose="05000000000000000000" pitchFamily="2" charset="2"/>
+              <a:buChar char="§"/>
+            </a:pPr>
+            <a:endParaRPr lang="es-ES" dirty="0"/>
+          </a:p>
+          <a:p>
+            <a:pPr lvl="2">
+              <a:buFont typeface="Wingdings" panose="05000000000000000000" pitchFamily="2" charset="2"/>
+              <a:buChar char="§"/>
+            </a:pPr>
+            <a:r>
+              <a:rPr lang="es-ES" dirty="0"/>
+              <a:t>La salida de esta consulta no tiene por qué ser lenguaje SQL ya que contendrá anotaciones y consejos entremezclados </a:t>
+            </a:r>
+          </a:p>
+          <a:p>
+            <a:pPr lvl="2">
+              <a:buFont typeface="Wingdings" panose="05000000000000000000" pitchFamily="2" charset="2"/>
+              <a:buChar char="§"/>
+            </a:pPr>
+            <a:endParaRPr lang="es-ES" dirty="0"/>
+          </a:p>
+        </p:txBody>
+      </p:sp>
+    </p:spTree>
+    <p:extLst>
+      <p:ext uri="{BB962C8B-B14F-4D97-AF65-F5344CB8AC3E}">
+        <p14:creationId xmlns:p14="http://schemas.microsoft.com/office/powerpoint/2010/main" val="1903563078"/>
+      </p:ext>
+    </p:extLst>
+  </p:cSld>
+  <p:clrMapOvr>
+    <a:masterClrMapping/>
+  </p:clrMapOvr>
+</p:sld>
+</file>
+
+<file path=ppt/slides/slide6.xml><?xml version="1.0" encoding="utf-8"?>
+<p:sld xmlns:a="http://schemas.openxmlformats.org/drawingml/2006/main" xmlns:r="http://schemas.openxmlformats.org/officeDocument/2006/relationships" xmlns:p="http://schemas.openxmlformats.org/presentationml/2006/main">
+  <p:cSld>
+    <p:spTree>
+      <p:nvGrpSpPr>
+        <p:cNvPr id="1" name=""/>
+        <p:cNvGrpSpPr/>
+        <p:nvPr/>
+      </p:nvGrpSpPr>
+      <p:grpSpPr>
+        <a:xfrm>
+          <a:off x="0" y="0"/>
+          <a:ext cx="0" cy="0"/>
+          <a:chOff x="0" y="0"/>
+          <a:chExt cx="0" cy="0"/>
+        </a:xfrm>
+      </p:grpSpPr>
+      <p:sp>
+        <p:nvSpPr>
           <p:cNvPr id="2" name="Título 1">
             <a:extLst>
               <a:ext uri="{FF2B5EF4-FFF2-40B4-BE49-F238E27FC236}">
@@ -5365,7 +5943,7 @@
 </p:sld>
 </file>
 
-<file path=ppt/slides/slide6.xml><?xml version="1.0" encoding="utf-8"?>
+<file path=ppt/slides/slide7.xml><?xml version="1.0" encoding="utf-8"?>
 <p:sld xmlns:a="http://schemas.openxmlformats.org/drawingml/2006/main" xmlns:r="http://schemas.openxmlformats.org/officeDocument/2006/relationships" xmlns:p="http://schemas.openxmlformats.org/presentationml/2006/main">
   <p:cSld>
     <p:spTree>
@@ -5904,90 +6482,6 @@
 </p:sld>
 </file>
 
-<file path=ppt/slides/slide7.xml><?xml version="1.0" encoding="utf-8"?>
-<p:sld xmlns:a="http://schemas.openxmlformats.org/drawingml/2006/main" xmlns:r="http://schemas.openxmlformats.org/officeDocument/2006/relationships" xmlns:p="http://schemas.openxmlformats.org/presentationml/2006/main">
-  <p:cSld>
-    <p:spTree>
-      <p:nvGrpSpPr>
-        <p:cNvPr id="1" name=""/>
-        <p:cNvGrpSpPr/>
-        <p:nvPr/>
-      </p:nvGrpSpPr>
-      <p:grpSpPr>
-        <a:xfrm>
-          <a:off x="0" y="0"/>
-          <a:ext cx="0" cy="0"/>
-          <a:chOff x="0" y="0"/>
-          <a:chExt cx="0" cy="0"/>
-        </a:xfrm>
-      </p:grpSpPr>
-      <p:sp>
-        <p:nvSpPr>
-          <p:cNvPr id="2" name="Título 1">
-            <a:extLst>
-              <a:ext uri="{FF2B5EF4-FFF2-40B4-BE49-F238E27FC236}">
-                <a16:creationId xmlns:a16="http://schemas.microsoft.com/office/drawing/2014/main" id="{A1154355-ACC9-4C98-89BF-2BDAF67CFEE7}"/>
-              </a:ext>
-            </a:extLst>
-          </p:cNvPr>
-          <p:cNvSpPr>
-            <a:spLocks noGrp="1"/>
-          </p:cNvSpPr>
-          <p:nvPr>
-            <p:ph type="title"/>
-          </p:nvPr>
-        </p:nvSpPr>
-        <p:spPr/>
-        <p:txBody>
-          <a:bodyPr/>
-          <a:lstStyle/>
-          <a:p>
-            <a:r>
-              <a:rPr lang="es-ES" b="1" dirty="0"/>
-              <a:t>Índices</a:t>
-            </a:r>
-            <a:endParaRPr lang="es-ES" dirty="0"/>
-          </a:p>
-        </p:txBody>
-      </p:sp>
-      <p:sp>
-        <p:nvSpPr>
-          <p:cNvPr id="3" name="Marcador de contenido 2">
-            <a:extLst>
-              <a:ext uri="{FF2B5EF4-FFF2-40B4-BE49-F238E27FC236}">
-                <a16:creationId xmlns:a16="http://schemas.microsoft.com/office/drawing/2014/main" id="{77BCC1A6-CDDF-4F4F-90CF-12FB6F98BBDC}"/>
-              </a:ext>
-            </a:extLst>
-          </p:cNvPr>
-          <p:cNvSpPr>
-            <a:spLocks noGrp="1"/>
-          </p:cNvSpPr>
-          <p:nvPr>
-            <p:ph idx="1"/>
-          </p:nvPr>
-        </p:nvSpPr>
-        <p:spPr/>
-        <p:txBody>
-          <a:bodyPr/>
-          <a:lstStyle/>
-          <a:p>
-            <a:endParaRPr lang="es-ES"/>
-          </a:p>
-        </p:txBody>
-      </p:sp>
-    </p:spTree>
-    <p:extLst>
-      <p:ext uri="{BB962C8B-B14F-4D97-AF65-F5344CB8AC3E}">
-        <p14:creationId xmlns:p14="http://schemas.microsoft.com/office/powerpoint/2010/main" val="2376211969"/>
-      </p:ext>
-    </p:extLst>
-  </p:cSld>
-  <p:clrMapOvr>
-    <a:masterClrMapping/>
-  </p:clrMapOvr>
-</p:sld>
-</file>
-
 <file path=ppt/slides/slide8.xml><?xml version="1.0" encoding="utf-8"?>
 <p:sld xmlns:a="http://schemas.openxmlformats.org/drawingml/2006/main" xmlns:r="http://schemas.openxmlformats.org/officeDocument/2006/relationships" xmlns:p="http://schemas.openxmlformats.org/presentationml/2006/main">
   <p:cSld>
@@ -6010,7 +6504,7 @@
           <p:cNvPr id="2" name="Título 1">
             <a:extLst>
               <a:ext uri="{FF2B5EF4-FFF2-40B4-BE49-F238E27FC236}">
-                <a16:creationId xmlns:a16="http://schemas.microsoft.com/office/drawing/2014/main" id="{0C27B4C5-C1C9-406F-B70A-3BDD3BD8B2EF}"/>
+                <a16:creationId xmlns:a16="http://schemas.microsoft.com/office/drawing/2014/main" id="{A1154355-ACC9-4C98-89BF-2BDAF67CFEE7}"/>
               </a:ext>
             </a:extLst>
           </p:cNvPr>
@@ -6028,7 +6522,7 @@
           <a:p>
             <a:r>
               <a:rPr lang="es-ES" b="1" dirty="0"/>
-              <a:t>Sentencia OPTIMIZE TABLE</a:t>
+              <a:t>Índices</a:t>
             </a:r>
             <a:endParaRPr lang="es-ES" dirty="0"/>
           </a:p>
@@ -6039,7 +6533,7 @@
           <p:cNvPr id="3" name="Marcador de contenido 2">
             <a:extLst>
               <a:ext uri="{FF2B5EF4-FFF2-40B4-BE49-F238E27FC236}">
-                <a16:creationId xmlns:a16="http://schemas.microsoft.com/office/drawing/2014/main" id="{4E421112-E50D-4D60-B3EA-498E13D90036}"/>
+                <a16:creationId xmlns:a16="http://schemas.microsoft.com/office/drawing/2014/main" id="{77BCC1A6-CDDF-4F4F-90CF-12FB6F98BBDC}"/>
               </a:ext>
             </a:extLst>
           </p:cNvPr>
@@ -6061,7 +6555,37 @@
             </a:pPr>
             <a:r>
               <a:rPr lang="es-ES" dirty="0"/>
-              <a:t>Reorganiza el almacenamiento físico de una tabla de datos y datos indexados asociados para:</a:t>
+              <a:t>Los índices son utilizados por MySQL para encontrar filas de forma más rápida.</a:t>
+            </a:r>
+          </a:p>
+          <a:p>
+            <a:pPr>
+              <a:buFont typeface="Wingdings" panose="05000000000000000000" pitchFamily="2" charset="2"/>
+              <a:buChar char="q"/>
+            </a:pPr>
+            <a:r>
+              <a:rPr lang="es-ES" dirty="0"/>
+              <a:t>Evitan tener que recorrer las tablas fila a fila.</a:t>
+            </a:r>
+          </a:p>
+          <a:p>
+            <a:pPr>
+              <a:buFont typeface="Wingdings" panose="05000000000000000000" pitchFamily="2" charset="2"/>
+              <a:buChar char="q"/>
+            </a:pPr>
+            <a:r>
+              <a:rPr lang="es-ES" dirty="0"/>
+              <a:t>La importancia de estos es directamente proporcional al tamaño de la tabla relacionada con la consulta.</a:t>
+            </a:r>
+          </a:p>
+          <a:p>
+            <a:pPr>
+              <a:buFont typeface="Wingdings" panose="05000000000000000000" pitchFamily="2" charset="2"/>
+              <a:buChar char="q"/>
+            </a:pPr>
+            <a:r>
+              <a:rPr lang="es-ES" dirty="0"/>
+              <a:t>Existen distintos tipos de índices contribuyendo así a distintos tipos de optimizaciones:</a:t>
             </a:r>
           </a:p>
           <a:p>
@@ -6071,7 +6595,25 @@
             </a:pPr>
             <a:r>
               <a:rPr lang="es-ES" dirty="0"/>
-              <a:t>Reducir el espacio de almacenamiento</a:t>
+              <a:t>Optimización de clave primaria</a:t>
+            </a:r>
+          </a:p>
+          <a:p>
+            <a:pPr lvl="2">
+              <a:buFont typeface="Wingdings" panose="05000000000000000000" pitchFamily="2" charset="2"/>
+              <a:buChar char="§"/>
+            </a:pPr>
+            <a:r>
+              <a:rPr lang="es-ES" dirty="0"/>
+              <a:t>Índice asociado a esta columna, se beneficia de la condición NOT NULL de las </a:t>
+            </a:r>
+            <a:r>
+              <a:rPr lang="es-ES" dirty="0" err="1"/>
+              <a:t>PKs</a:t>
+            </a:r>
+            <a:r>
+              <a:rPr lang="es-ES" dirty="0"/>
+              <a:t>.</a:t>
             </a:r>
           </a:p>
           <a:p>
@@ -6081,17 +6623,7 @@
             </a:pPr>
             <a:r>
               <a:rPr lang="es-ES" dirty="0"/>
-              <a:t>Mejorar la eficiencia entrada/salida cuando se accede a la tabla</a:t>
-            </a:r>
-          </a:p>
-          <a:p>
-            <a:pPr>
-              <a:buFont typeface="Wingdings" panose="05000000000000000000" pitchFamily="2" charset="2"/>
-              <a:buChar char="q"/>
-            </a:pPr>
-            <a:r>
-              <a:rPr lang="es-ES" dirty="0"/>
-              <a:t>Ejecutar esta sentencia para compactar, optimizar y ahorrar espacio cuando:</a:t>
+              <a:t>Optimizaciones mediante índices espaciales (SPATIAL).</a:t>
             </a:r>
           </a:p>
           <a:p>
@@ -6101,7 +6633,25 @@
             </a:pPr>
             <a:r>
               <a:rPr lang="es-ES" dirty="0"/>
-              <a:t>El tamaño de la cantidad de datos en las tablas se estabiliza</a:t>
+              <a:t>Optimización de clave foránea.</a:t>
+            </a:r>
+          </a:p>
+          <a:p>
+            <a:pPr lvl="2">
+              <a:buFont typeface="Wingdings" panose="05000000000000000000" pitchFamily="2" charset="2"/>
+              <a:buChar char="§"/>
+            </a:pPr>
+            <a:r>
+              <a:rPr lang="es-ES" dirty="0"/>
+              <a:t>Si hay un gran número de filas que se quieren usar en una tabla, se pueden agrupar los datos menos utilizados en una tabla a parte replicando el atributo ID y teniendo una </a:t>
+            </a:r>
+            <a:r>
+              <a:rPr lang="es-ES" dirty="0" err="1"/>
+              <a:t>Pk</a:t>
+            </a:r>
+            <a:r>
+              <a:rPr lang="es-ES" dirty="0"/>
+              <a:t> en cada tabla pequeña.</a:t>
             </a:r>
           </a:p>
           <a:p>
@@ -6109,37 +6659,14 @@
               <a:buFont typeface="Wingdings" panose="05000000000000000000" pitchFamily="2" charset="2"/>
               <a:buChar char="§"/>
             </a:pPr>
-            <a:r>
-              <a:rPr lang="es-ES" dirty="0"/>
-              <a:t>Los datos crecen en grandes cantidades</a:t>
-            </a:r>
-          </a:p>
-          <a:p>
-            <a:pPr>
-              <a:buFont typeface="Wingdings" panose="05000000000000000000" pitchFamily="2" charset="2"/>
-              <a:buChar char="q"/>
-            </a:pPr>
-            <a:r>
-              <a:rPr lang="es-ES" dirty="0"/>
-              <a:t>Puede mejorar todas las operaciones relacionadas con la tabla optimizada</a:t>
-            </a:r>
-          </a:p>
-          <a:p>
-            <a:pPr>
-              <a:buFont typeface="Wingdings" panose="05000000000000000000" pitchFamily="2" charset="2"/>
-              <a:buChar char="q"/>
-            </a:pPr>
-            <a:r>
-              <a:rPr lang="es-ES" dirty="0"/>
-              <a:t>Funciona en todas las ocasiones</a:t>
-            </a:r>
+            <a:endParaRPr lang="es-ES" dirty="0"/>
           </a:p>
         </p:txBody>
       </p:sp>
     </p:spTree>
     <p:extLst>
       <p:ext uri="{BB962C8B-B14F-4D97-AF65-F5344CB8AC3E}">
-        <p14:creationId xmlns:p14="http://schemas.microsoft.com/office/powerpoint/2010/main" val="2426996589"/>
+        <p14:creationId xmlns:p14="http://schemas.microsoft.com/office/powerpoint/2010/main" val="2376211969"/>
       </p:ext>
     </p:extLst>
   </p:cSld>
@@ -6171,7 +6698,7 @@
           <p:cNvPr id="2" name="Título 1">
             <a:extLst>
               <a:ext uri="{FF2B5EF4-FFF2-40B4-BE49-F238E27FC236}">
-                <a16:creationId xmlns:a16="http://schemas.microsoft.com/office/drawing/2014/main" id="{7F5CDF1F-8C71-4329-8F1E-E61E94D79E51}"/>
+                <a16:creationId xmlns:a16="http://schemas.microsoft.com/office/drawing/2014/main" id="{0C27B4C5-C1C9-406F-B70A-3BDD3BD8B2EF}"/>
               </a:ext>
             </a:extLst>
           </p:cNvPr>
@@ -6189,7 +6716,7 @@
           <a:p>
             <a:r>
               <a:rPr lang="es-ES" b="1" dirty="0"/>
-              <a:t>Sentencia INSERT DELAYED</a:t>
+              <a:t>Sentencia OPTIMIZE TABLE</a:t>
             </a:r>
             <a:endParaRPr lang="es-ES" dirty="0"/>
           </a:p>
@@ -6200,7 +6727,7 @@
           <p:cNvPr id="3" name="Marcador de contenido 2">
             <a:extLst>
               <a:ext uri="{FF2B5EF4-FFF2-40B4-BE49-F238E27FC236}">
-                <a16:creationId xmlns:a16="http://schemas.microsoft.com/office/drawing/2014/main" id="{BCE68218-8BB9-4A5C-B7E7-5F91C0406948}"/>
+                <a16:creationId xmlns:a16="http://schemas.microsoft.com/office/drawing/2014/main" id="{4E421112-E50D-4D60-B3EA-498E13D90036}"/>
               </a:ext>
             </a:extLst>
           </p:cNvPr>
@@ -6211,16 +6738,9 @@
             <p:ph idx="1"/>
           </p:nvPr>
         </p:nvSpPr>
-        <p:spPr>
-          <a:xfrm>
-            <a:off x="1097280" y="1845733"/>
-            <a:ext cx="10058400" cy="4461063"/>
-          </a:xfrm>
-        </p:spPr>
-        <p:txBody>
-          <a:bodyPr>
-            <a:normAutofit fontScale="92500" lnSpcReduction="20000"/>
-          </a:bodyPr>
+        <p:spPr/>
+        <p:txBody>
+          <a:bodyPr/>
           <a:lstStyle/>
           <a:p>
             <a:pPr>
@@ -6229,7 +6749,7 @@
             </a:pPr>
             <a:r>
               <a:rPr lang="es-ES" dirty="0"/>
-              <a:t>Para optimizar sentencias INSERT y mejorar su velocidad</a:t>
+              <a:t>Reorganiza el almacenamiento físico de una tabla de datos y datos indexados asociados para:</a:t>
             </a:r>
           </a:p>
           <a:p>
@@ -6239,7 +6759,7 @@
             </a:pPr>
             <a:r>
               <a:rPr lang="es-ES" dirty="0"/>
-              <a:t>Fusionar múltiples operaciones pequeñas en una sola</a:t>
+              <a:t>Reducir el espacio de almacenamiento</a:t>
             </a:r>
           </a:p>
           <a:p>
@@ -6249,7 +6769,17 @@
             </a:pPr>
             <a:r>
               <a:rPr lang="es-ES" dirty="0"/>
-              <a:t>Realizar el menor número de conexiones con la tabla donde se van a insertar</a:t>
+              <a:t>Mejorar la eficiencia entrada/salida cuando se accede a la tabla</a:t>
+            </a:r>
+          </a:p>
+          <a:p>
+            <a:pPr>
+              <a:buFont typeface="Wingdings" panose="05000000000000000000" pitchFamily="2" charset="2"/>
+              <a:buChar char="q"/>
+            </a:pPr>
+            <a:r>
+              <a:rPr lang="es-ES" dirty="0"/>
+              <a:t>Ejecutar esta sentencia para compactar, optimizar y ahorrar espacio cuando:</a:t>
             </a:r>
           </a:p>
           <a:p>
@@ -6259,27 +6789,7 @@
             </a:pPr>
             <a:r>
               <a:rPr lang="es-ES" dirty="0"/>
-              <a:t>Mandar el mayor de tuplas de una sola vez retrasando:</a:t>
-            </a:r>
-          </a:p>
-          <a:p>
-            <a:pPr lvl="2">
-              <a:buFont typeface="Arial" panose="020B0604020202020204" pitchFamily="34" charset="0"/>
-              <a:buChar char="•"/>
-            </a:pPr>
-            <a:r>
-              <a:rPr lang="es-ES" dirty="0"/>
-              <a:t>La actualización de índices</a:t>
-            </a:r>
-          </a:p>
-          <a:p>
-            <a:pPr lvl="2">
-              <a:buFont typeface="Arial" panose="020B0604020202020204" pitchFamily="34" charset="0"/>
-              <a:buChar char="•"/>
-            </a:pPr>
-            <a:r>
-              <a:rPr lang="es-ES" dirty="0"/>
-              <a:t>La comprobación de consistencia</a:t>
+              <a:t>El tamaño de la cantidad de datos en las tablas se estabiliza</a:t>
             </a:r>
           </a:p>
           <a:p>
@@ -6289,27 +6799,7 @@
             </a:pPr>
             <a:r>
               <a:rPr lang="es-ES" dirty="0"/>
-              <a:t>Usar sentencias INSERT con múltiples listas de VALUE</a:t>
-            </a:r>
-          </a:p>
-          <a:p>
-            <a:pPr lvl="1">
-              <a:buFont typeface="Wingdings" panose="05000000000000000000" pitchFamily="2" charset="2"/>
-              <a:buChar char="§"/>
-            </a:pPr>
-            <a:r>
-              <a:rPr lang="es-ES" dirty="0"/>
-              <a:t>Usar LOAD DATA cuando se cargue una tabla de un archivo de texto</a:t>
-            </a:r>
-          </a:p>
-          <a:p>
-            <a:pPr lvl="1">
-              <a:buFont typeface="Wingdings" panose="05000000000000000000" pitchFamily="2" charset="2"/>
-              <a:buChar char="§"/>
-            </a:pPr>
-            <a:r>
-              <a:rPr lang="es-ES" dirty="0"/>
-              <a:t>Insertar valores solo cuando el valor a insertar es distinto del valor por defecto de la columna</a:t>
+              <a:t>Los datos crecen en grandes cantidades</a:t>
             </a:r>
           </a:p>
           <a:p>
@@ -6319,57 +6809,17 @@
             </a:pPr>
             <a:r>
               <a:rPr lang="es-ES" dirty="0"/>
-              <a:t>Opción DELAYED</a:t>
-            </a:r>
-          </a:p>
-          <a:p>
-            <a:pPr lvl="1">
-              <a:buFont typeface="Wingdings" panose="05000000000000000000" pitchFamily="2" charset="2"/>
-              <a:buChar char="§"/>
-            </a:pPr>
-            <a:r>
-              <a:rPr lang="es-ES" dirty="0"/>
-              <a:t>Extensión de MySQL al estándar SQL</a:t>
-            </a:r>
-          </a:p>
-          <a:p>
-            <a:pPr lvl="1">
-              <a:buFont typeface="Wingdings" panose="05000000000000000000" pitchFamily="2" charset="2"/>
-              <a:buChar char="§"/>
-            </a:pPr>
-            <a:r>
-              <a:rPr lang="es-ES" dirty="0"/>
-              <a:t>Obsoleta desde MySQL 5.6</a:t>
-            </a:r>
-          </a:p>
-          <a:p>
-            <a:pPr lvl="1">
-              <a:buFont typeface="Wingdings" panose="05000000000000000000" pitchFamily="2" charset="2"/>
-              <a:buChar char="§"/>
-            </a:pPr>
-            <a:r>
-              <a:rPr lang="es-ES" b="1" dirty="0"/>
-              <a:t>Cuando un cliente usaba esta sentencia sobre una tabla, la tupla se almacenaba en una cola para insertarse cuando esta tabla no estuviera en uso</a:t>
-            </a:r>
-          </a:p>
-          <a:p>
-            <a:pPr lvl="1">
-              <a:buFont typeface="Wingdings" panose="05000000000000000000" pitchFamily="2" charset="2"/>
-              <a:buChar char="§"/>
-            </a:pPr>
-            <a:r>
-              <a:rPr lang="es-ES" dirty="0"/>
-              <a:t>En MySQL 8.0 el servidor reconoce la opción DELAYED, pero la ignora</a:t>
-            </a:r>
-          </a:p>
-          <a:p>
-            <a:pPr lvl="1">
-              <a:buFont typeface="Wingdings" panose="05000000000000000000" pitchFamily="2" charset="2"/>
-              <a:buChar char="§"/>
-            </a:pPr>
-            <a:r>
-              <a:rPr lang="es-ES" dirty="0"/>
-              <a:t>Se planea eliminar esta palabra reservada</a:t>
+              <a:t>Puede mejorar todas las operaciones relacionadas con la tabla optimizada</a:t>
+            </a:r>
+          </a:p>
+          <a:p>
+            <a:pPr>
+              <a:buFont typeface="Wingdings" panose="05000000000000000000" pitchFamily="2" charset="2"/>
+              <a:buChar char="q"/>
+            </a:pPr>
+            <a:r>
+              <a:rPr lang="es-ES" dirty="0"/>
+              <a:t>Funciona en todas las ocasiones</a:t>
             </a:r>
           </a:p>
         </p:txBody>
@@ -6377,7 +6827,7 @@
     </p:spTree>
     <p:extLst>
       <p:ext uri="{BB962C8B-B14F-4D97-AF65-F5344CB8AC3E}">
-        <p14:creationId xmlns:p14="http://schemas.microsoft.com/office/powerpoint/2010/main" val="730295487"/>
+        <p14:creationId xmlns:p14="http://schemas.microsoft.com/office/powerpoint/2010/main" val="2426996589"/>
       </p:ext>
     </p:extLst>
   </p:cSld>

</xml_diff>